<commit_message>
added workshop url link
</commit_message>
<xml_diff>
--- a/rrn_intro.pptx
+++ b/rrn_intro.pptx
@@ -859,7 +859,7 @@
           <a:p>
             <a:fld id="{421D938C-9D30-4591-B78B-02250B6189B6}" type="datetimeFigureOut">
               <a:rPr lang="en-US" smtClean="0"/>
-              <a:t>5/27/2019</a:t>
+              <a:t>5/28/2019</a:t>
             </a:fld>
             <a:endParaRPr lang="en-US"/>
           </a:p>
@@ -1057,7 +1057,7 @@
           <a:p>
             <a:fld id="{421D938C-9D30-4591-B78B-02250B6189B6}" type="datetimeFigureOut">
               <a:rPr lang="en-US" smtClean="0"/>
-              <a:t>5/27/2019</a:t>
+              <a:t>5/28/2019</a:t>
             </a:fld>
             <a:endParaRPr lang="en-US"/>
           </a:p>
@@ -1265,7 +1265,7 @@
           <a:p>
             <a:fld id="{421D938C-9D30-4591-B78B-02250B6189B6}" type="datetimeFigureOut">
               <a:rPr lang="en-US" smtClean="0"/>
-              <a:t>5/27/2019</a:t>
+              <a:t>5/28/2019</a:t>
             </a:fld>
             <a:endParaRPr lang="en-US"/>
           </a:p>
@@ -1463,7 +1463,7 @@
           <a:p>
             <a:fld id="{421D938C-9D30-4591-B78B-02250B6189B6}" type="datetimeFigureOut">
               <a:rPr lang="en-US" smtClean="0"/>
-              <a:t>5/27/2019</a:t>
+              <a:t>5/28/2019</a:t>
             </a:fld>
             <a:endParaRPr lang="en-US"/>
           </a:p>
@@ -1738,7 +1738,7 @@
           <a:p>
             <a:fld id="{421D938C-9D30-4591-B78B-02250B6189B6}" type="datetimeFigureOut">
               <a:rPr lang="en-US" smtClean="0"/>
-              <a:t>5/27/2019</a:t>
+              <a:t>5/28/2019</a:t>
             </a:fld>
             <a:endParaRPr lang="en-US"/>
           </a:p>
@@ -2003,7 +2003,7 @@
           <a:p>
             <a:fld id="{421D938C-9D30-4591-B78B-02250B6189B6}" type="datetimeFigureOut">
               <a:rPr lang="en-US" smtClean="0"/>
-              <a:t>5/27/2019</a:t>
+              <a:t>5/28/2019</a:t>
             </a:fld>
             <a:endParaRPr lang="en-US"/>
           </a:p>
@@ -2415,7 +2415,7 @@
           <a:p>
             <a:fld id="{421D938C-9D30-4591-B78B-02250B6189B6}" type="datetimeFigureOut">
               <a:rPr lang="en-US" smtClean="0"/>
-              <a:t>5/27/2019</a:t>
+              <a:t>5/28/2019</a:t>
             </a:fld>
             <a:endParaRPr lang="en-US"/>
           </a:p>
@@ -2556,7 +2556,7 @@
           <a:p>
             <a:fld id="{421D938C-9D30-4591-B78B-02250B6189B6}" type="datetimeFigureOut">
               <a:rPr lang="en-US" smtClean="0"/>
-              <a:t>5/27/2019</a:t>
+              <a:t>5/28/2019</a:t>
             </a:fld>
             <a:endParaRPr lang="en-US"/>
           </a:p>
@@ -2669,7 +2669,7 @@
           <a:p>
             <a:fld id="{421D938C-9D30-4591-B78B-02250B6189B6}" type="datetimeFigureOut">
               <a:rPr lang="en-US" smtClean="0"/>
-              <a:t>5/27/2019</a:t>
+              <a:t>5/28/2019</a:t>
             </a:fld>
             <a:endParaRPr lang="en-US"/>
           </a:p>
@@ -2980,7 +2980,7 @@
           <a:p>
             <a:fld id="{421D938C-9D30-4591-B78B-02250B6189B6}" type="datetimeFigureOut">
               <a:rPr lang="en-US" smtClean="0"/>
-              <a:t>5/27/2019</a:t>
+              <a:t>5/28/2019</a:t>
             </a:fld>
             <a:endParaRPr lang="en-US"/>
           </a:p>
@@ -3268,7 +3268,7 @@
           <a:p>
             <a:fld id="{421D938C-9D30-4591-B78B-02250B6189B6}" type="datetimeFigureOut">
               <a:rPr lang="en-US" smtClean="0"/>
-              <a:t>5/27/2019</a:t>
+              <a:t>5/28/2019</a:t>
             </a:fld>
             <a:endParaRPr lang="en-US"/>
           </a:p>
@@ -3509,7 +3509,7 @@
           <a:p>
             <a:fld id="{421D938C-9D30-4591-B78B-02250B6189B6}" type="datetimeFigureOut">
               <a:rPr lang="en-US" smtClean="0"/>
-              <a:t>5/27/2019</a:t>
+              <a:t>5/28/2019</a:t>
             </a:fld>
             <a:endParaRPr lang="en-US"/>
           </a:p>
@@ -3991,6 +3991,54 @@
           </a:p>
         </p:txBody>
       </p:sp>
+      <p:sp>
+        <p:nvSpPr>
+          <p:cNvPr id="4" name="TextBox 3">
+            <a:extLst>
+              <a:ext uri="{FF2B5EF4-FFF2-40B4-BE49-F238E27FC236}">
+                <a16:creationId xmlns:a16="http://schemas.microsoft.com/office/drawing/2014/main" id="{8D15B066-9A65-45E4-A18D-B97E8627201A}"/>
+              </a:ext>
+            </a:extLst>
+          </p:cNvPr>
+          <p:cNvSpPr txBox="1"/>
+          <p:nvPr/>
+        </p:nvSpPr>
+        <p:spPr>
+          <a:xfrm>
+            <a:off x="884189" y="6308209"/>
+            <a:ext cx="5779659" cy="369332"/>
+          </a:xfrm>
+          <a:prstGeom prst="rect">
+            <a:avLst/>
+          </a:prstGeom>
+          <a:noFill/>
+        </p:spPr>
+        <p:txBody>
+          <a:bodyPr wrap="none" rtlCol="0">
+            <a:spAutoFit/>
+          </a:bodyPr>
+          <a:lstStyle/>
+          <a:p>
+            <a:r>
+              <a:rPr lang="en-US" dirty="0"/>
+              <a:t>Workshop website: </a:t>
+            </a:r>
+            <a:r>
+              <a:rPr lang="en-US" dirty="0">
+                <a:hlinkClick r:id="rId2"/>
+              </a:rPr>
+              <a:t>https://tdmdal.github.io/rrn-workshop</a:t>
+            </a:r>
+            <a:r>
+              <a:rPr lang="en-US" dirty="0" smtClean="0">
+                <a:hlinkClick r:id="rId2"/>
+              </a:rPr>
+              <a:t>/</a:t>
+            </a:r>
+            <a:endParaRPr lang="en-US" dirty="0"/>
+          </a:p>
+        </p:txBody>
+      </p:sp>
     </p:spTree>
     <p:extLst>
       <p:ext uri="{BB962C8B-B14F-4D97-AF65-F5344CB8AC3E}">
@@ -7454,7 +7502,7 @@
             <p:ph idx="1"/>
             <p:extLst>
               <p:ext uri="{D42A27DB-BD31-4B8C-83A1-F6EECF244321}">
-                <p14:modId xmlns:p14="http://schemas.microsoft.com/office/powerpoint/2010/main" val="2332631904"/>
+                <p14:modId xmlns:p14="http://schemas.microsoft.com/office/powerpoint/2010/main" val="1706593815"/>
               </p:ext>
             </p:extLst>
           </p:nvPr>
@@ -7684,7 +7732,19 @@
                       </a:pPr>
                       <a:r>
                         <a:rPr lang="en-US" dirty="0"/>
-                        <a:t>~12 cores</a:t>
+                        <a:t>~12 </a:t>
+                      </a:r>
+                      <a:r>
+                        <a:rPr lang="en-US" dirty="0" smtClean="0"/>
+                        <a:t>cores, 1-2 </a:t>
+                      </a:r>
+                      <a:r>
+                        <a:rPr lang="en-US" dirty="0"/>
+                        <a:t>hrs. or </a:t>
+                      </a:r>
+                      <a:r>
+                        <a:rPr lang="en-US" dirty="0" smtClean="0"/>
+                        <a:t>…</a:t>
                       </a:r>
                     </a:p>
                     <a:p>
@@ -7693,9 +7753,14 @@
                         <a:buChar char="•"/>
                       </a:pPr>
                       <a:r>
-                        <a:rPr lang="en-US" dirty="0"/>
-                        <a:t>1-2 hrs. or …</a:t>
-                      </a:r>
+                        <a:rPr lang="en-US" dirty="0" smtClean="0"/>
+                        <a:t>~1-2</a:t>
+                      </a:r>
+                      <a:r>
+                        <a:rPr lang="en-US" baseline="0" dirty="0" smtClean="0"/>
+                        <a:t> cores, longer hrs.</a:t>
+                      </a:r>
+                      <a:endParaRPr lang="en-US" dirty="0"/>
                     </a:p>
                   </a:txBody>
                   <a:tcPr/>
@@ -8320,7 +8385,7 @@
             <p:ph idx="1"/>
             <p:extLst>
               <p:ext uri="{D42A27DB-BD31-4B8C-83A1-F6EECF244321}">
-                <p14:modId xmlns:p14="http://schemas.microsoft.com/office/powerpoint/2010/main" val="244281012"/>
+                <p14:modId xmlns:p14="http://schemas.microsoft.com/office/powerpoint/2010/main" val="2405591006"/>
               </p:ext>
             </p:extLst>
           </p:nvPr>
@@ -8549,8 +8614,8 @@
                         <a:buChar char="•"/>
                       </a:pPr>
                       <a:r>
-                        <a:rPr lang="en-US" dirty="0"/>
-                        <a:t>~12 cores</a:t>
+                        <a:rPr lang="en-US" dirty="0" smtClean="0"/>
+                        <a:t>~12 cores, 1-2 hrs. or …</a:t>
                       </a:r>
                     </a:p>
                     <a:p>
@@ -8559,9 +8624,14 @@
                         <a:buChar char="•"/>
                       </a:pPr>
                       <a:r>
-                        <a:rPr lang="en-US" dirty="0"/>
-                        <a:t>1-2 hrs. or …</a:t>
-                      </a:r>
+                        <a:rPr lang="en-US" dirty="0" smtClean="0"/>
+                        <a:t>~1-2</a:t>
+                      </a:r>
+                      <a:r>
+                        <a:rPr lang="en-US" baseline="0" dirty="0" smtClean="0"/>
+                        <a:t> cores, longer hrs.</a:t>
+                      </a:r>
+                      <a:endParaRPr lang="en-US" dirty="0"/>
                     </a:p>
                   </a:txBody>
                   <a:tcPr/>
@@ -9049,7 +9119,7 @@
             <p:ph idx="1"/>
             <p:extLst>
               <p:ext uri="{D42A27DB-BD31-4B8C-83A1-F6EECF244321}">
-                <p14:modId xmlns:p14="http://schemas.microsoft.com/office/powerpoint/2010/main" val="589083771"/>
+                <p14:modId xmlns:p14="http://schemas.microsoft.com/office/powerpoint/2010/main" val="2472960618"/>
               </p:ext>
             </p:extLst>
           </p:nvPr>
@@ -9278,8 +9348,8 @@
                         <a:buChar char="•"/>
                       </a:pPr>
                       <a:r>
-                        <a:rPr lang="en-US" dirty="0"/>
-                        <a:t>~12 cores</a:t>
+                        <a:rPr lang="en-US" dirty="0" smtClean="0"/>
+                        <a:t>~12 cores, 1-2 hrs. or …</a:t>
                       </a:r>
                     </a:p>
                     <a:p>
@@ -9288,9 +9358,14 @@
                         <a:buChar char="•"/>
                       </a:pPr>
                       <a:r>
-                        <a:rPr lang="en-US" dirty="0"/>
-                        <a:t>1-2 hrs. or …</a:t>
-                      </a:r>
+                        <a:rPr lang="en-US" dirty="0" smtClean="0"/>
+                        <a:t>~1-2</a:t>
+                      </a:r>
+                      <a:r>
+                        <a:rPr lang="en-US" baseline="0" dirty="0" smtClean="0"/>
+                        <a:t> cores, longer hrs.</a:t>
+                      </a:r>
+                      <a:endParaRPr lang="en-US" dirty="0"/>
                     </a:p>
                   </a:txBody>
                   <a:tcPr/>
@@ -11680,7 +11755,7 @@
           <p:nvPr/>
         </p:nvPicPr>
         <p:blipFill>
-          <a:blip r:embed="rId2" cstate="print">
+          <a:blip r:embed="rId2" cstate="hqprint">
             <a:extLst>
               <a:ext uri="{28A0092B-C50C-407E-A947-70E740481C1C}">
                 <a14:useLocalDpi xmlns:a14="http://schemas.microsoft.com/office/drawing/2010/main" val="0"/>
@@ -11802,7 +11877,7 @@
           <p:nvPr/>
         </p:nvPicPr>
         <p:blipFill>
-          <a:blip r:embed="rId3" cstate="print">
+          <a:blip r:embed="rId3" cstate="hqprint">
             <a:extLst>
               <a:ext uri="{28A0092B-C50C-407E-A947-70E740481C1C}">
                 <a14:useLocalDpi xmlns:a14="http://schemas.microsoft.com/office/drawing/2010/main" val="0"/>
@@ -13547,7 +13622,7 @@
           <p:nvPr/>
         </p:nvPicPr>
         <p:blipFill>
-          <a:blip r:embed="rId2" cstate="print">
+          <a:blip r:embed="rId2" cstate="hqprint">
             <a:extLst>
               <a:ext uri="{28A0092B-C50C-407E-A947-70E740481C1C}">
                 <a14:useLocalDpi xmlns:a14="http://schemas.microsoft.com/office/drawing/2010/main" val="0"/>
@@ -13618,7 +13693,7 @@
           <p:nvPr/>
         </p:nvPicPr>
         <p:blipFill>
-          <a:blip r:embed="rId3" cstate="print">
+          <a:blip r:embed="rId3" cstate="hqprint">
             <a:extLst>
               <a:ext uri="{28A0092B-C50C-407E-A947-70E740481C1C}">
                 <a14:useLocalDpi xmlns:a14="http://schemas.microsoft.com/office/drawing/2010/main" val="0"/>
@@ -13926,7 +14001,7 @@
           <p:nvPr/>
         </p:nvPicPr>
         <p:blipFill>
-          <a:blip r:embed="rId2" cstate="print">
+          <a:blip r:embed="rId2" cstate="hqprint">
             <a:extLst>
               <a:ext uri="{28A0092B-C50C-407E-A947-70E740481C1C}">
                 <a14:useLocalDpi xmlns:a14="http://schemas.microsoft.com/office/drawing/2010/main" val="0"/>
@@ -13962,7 +14037,7 @@
           <p:nvPr/>
         </p:nvPicPr>
         <p:blipFill>
-          <a:blip r:embed="rId2" cstate="print">
+          <a:blip r:embed="rId2" cstate="hqprint">
             <a:extLst>
               <a:ext uri="{28A0092B-C50C-407E-A947-70E740481C1C}">
                 <a14:useLocalDpi xmlns:a14="http://schemas.microsoft.com/office/drawing/2010/main" val="0"/>
@@ -13998,7 +14073,7 @@
           <p:nvPr/>
         </p:nvPicPr>
         <p:blipFill>
-          <a:blip r:embed="rId3" cstate="print">
+          <a:blip r:embed="rId3" cstate="hqprint">
             <a:extLst>
               <a:ext uri="{28A0092B-C50C-407E-A947-70E740481C1C}">
                 <a14:useLocalDpi xmlns:a14="http://schemas.microsoft.com/office/drawing/2010/main" val="0"/>
@@ -14161,7 +14236,7 @@
           <p:nvPr/>
         </p:nvPicPr>
         <p:blipFill>
-          <a:blip r:embed="rId4" cstate="print">
+          <a:blip r:embed="rId4" cstate="hqprint">
             <a:extLst>
               <a:ext uri="{28A0092B-C50C-407E-A947-70E740481C1C}">
                 <a14:useLocalDpi xmlns:a14="http://schemas.microsoft.com/office/drawing/2010/main" val="0"/>
@@ -14504,7 +14579,7 @@
           <p:nvPr/>
         </p:nvPicPr>
         <p:blipFill>
-          <a:blip r:embed="rId2" cstate="print">
+          <a:blip r:embed="rId2" cstate="hqprint">
             <a:extLst>
               <a:ext uri="{28A0092B-C50C-407E-A947-70E740481C1C}">
                 <a14:useLocalDpi xmlns:a14="http://schemas.microsoft.com/office/drawing/2010/main" val="0"/>
@@ -14540,7 +14615,7 @@
           <p:nvPr/>
         </p:nvPicPr>
         <p:blipFill>
-          <a:blip r:embed="rId2" cstate="print">
+          <a:blip r:embed="rId2" cstate="hqprint">
             <a:extLst>
               <a:ext uri="{28A0092B-C50C-407E-A947-70E740481C1C}">
                 <a14:useLocalDpi xmlns:a14="http://schemas.microsoft.com/office/drawing/2010/main" val="0"/>
@@ -14576,7 +14651,7 @@
           <p:nvPr/>
         </p:nvPicPr>
         <p:blipFill>
-          <a:blip r:embed="rId3" cstate="print">
+          <a:blip r:embed="rId3" cstate="hqprint">
             <a:extLst>
               <a:ext uri="{28A0092B-C50C-407E-A947-70E740481C1C}">
                 <a14:useLocalDpi xmlns:a14="http://schemas.microsoft.com/office/drawing/2010/main" val="0"/>
@@ -14612,7 +14687,7 @@
           <p:nvPr/>
         </p:nvPicPr>
         <p:blipFill>
-          <a:blip r:embed="rId4" cstate="print">
+          <a:blip r:embed="rId4" cstate="hqprint">
             <a:extLst>
               <a:ext uri="{28A0092B-C50C-407E-A947-70E740481C1C}">
                 <a14:useLocalDpi xmlns:a14="http://schemas.microsoft.com/office/drawing/2010/main" val="0"/>
@@ -14648,7 +14723,7 @@
           <p:nvPr/>
         </p:nvPicPr>
         <p:blipFill>
-          <a:blip r:embed="rId4" cstate="print">
+          <a:blip r:embed="rId4" cstate="hqprint">
             <a:extLst>
               <a:ext uri="{28A0092B-C50C-407E-A947-70E740481C1C}">
                 <a14:useLocalDpi xmlns:a14="http://schemas.microsoft.com/office/drawing/2010/main" val="0"/>
@@ -14684,7 +14759,7 @@
           <p:nvPr/>
         </p:nvPicPr>
         <p:blipFill>
-          <a:blip r:embed="rId4" cstate="print">
+          <a:blip r:embed="rId4" cstate="hqprint">
             <a:extLst>
               <a:ext uri="{28A0092B-C50C-407E-A947-70E740481C1C}">
                 <a14:useLocalDpi xmlns:a14="http://schemas.microsoft.com/office/drawing/2010/main" val="0"/>
@@ -15017,7 +15092,7 @@
           <p:nvPr/>
         </p:nvPicPr>
         <p:blipFill>
-          <a:blip r:embed="rId5" cstate="print">
+          <a:blip r:embed="rId5" cstate="hqprint">
             <a:extLst>
               <a:ext uri="{28A0092B-C50C-407E-A947-70E740481C1C}">
                 <a14:useLocalDpi xmlns:a14="http://schemas.microsoft.com/office/drawing/2010/main" val="0"/>
@@ -15133,7 +15208,7 @@
           <p:nvPr/>
         </p:nvPicPr>
         <p:blipFill>
-          <a:blip r:embed="rId4" cstate="print">
+          <a:blip r:embed="rId4" cstate="hqprint">
             <a:extLst>
               <a:ext uri="{28A0092B-C50C-407E-A947-70E740481C1C}">
                 <a14:useLocalDpi xmlns:a14="http://schemas.microsoft.com/office/drawing/2010/main" val="0"/>
@@ -15439,7 +15514,7 @@
           <p:nvPr/>
         </p:nvPicPr>
         <p:blipFill>
-          <a:blip r:embed="rId2" cstate="print">
+          <a:blip r:embed="rId2" cstate="hqprint">
             <a:extLst>
               <a:ext uri="{28A0092B-C50C-407E-A947-70E740481C1C}">
                 <a14:useLocalDpi xmlns:a14="http://schemas.microsoft.com/office/drawing/2010/main" val="0"/>
@@ -15475,7 +15550,7 @@
           <p:nvPr/>
         </p:nvPicPr>
         <p:blipFill>
-          <a:blip r:embed="rId2" cstate="print">
+          <a:blip r:embed="rId2" cstate="hqprint">
             <a:extLst>
               <a:ext uri="{28A0092B-C50C-407E-A947-70E740481C1C}">
                 <a14:useLocalDpi xmlns:a14="http://schemas.microsoft.com/office/drawing/2010/main" val="0"/>
@@ -15511,7 +15586,7 @@
           <p:nvPr/>
         </p:nvPicPr>
         <p:blipFill>
-          <a:blip r:embed="rId3" cstate="print">
+          <a:blip r:embed="rId3" cstate="hqprint">
             <a:extLst>
               <a:ext uri="{28A0092B-C50C-407E-A947-70E740481C1C}">
                 <a14:useLocalDpi xmlns:a14="http://schemas.microsoft.com/office/drawing/2010/main" val="0"/>
@@ -15547,7 +15622,7 @@
           <p:nvPr/>
         </p:nvPicPr>
         <p:blipFill>
-          <a:blip r:embed="rId4" cstate="print">
+          <a:blip r:embed="rId4" cstate="hqprint">
             <a:extLst>
               <a:ext uri="{28A0092B-C50C-407E-A947-70E740481C1C}">
                 <a14:useLocalDpi xmlns:a14="http://schemas.microsoft.com/office/drawing/2010/main" val="0"/>
@@ -15583,7 +15658,7 @@
           <p:nvPr/>
         </p:nvPicPr>
         <p:blipFill>
-          <a:blip r:embed="rId4" cstate="print">
+          <a:blip r:embed="rId4" cstate="hqprint">
             <a:extLst>
               <a:ext uri="{28A0092B-C50C-407E-A947-70E740481C1C}">
                 <a14:useLocalDpi xmlns:a14="http://schemas.microsoft.com/office/drawing/2010/main" val="0"/>
@@ -15619,7 +15694,7 @@
           <p:nvPr/>
         </p:nvPicPr>
         <p:blipFill>
-          <a:blip r:embed="rId4" cstate="print">
+          <a:blip r:embed="rId4" cstate="hqprint">
             <a:extLst>
               <a:ext uri="{28A0092B-C50C-407E-A947-70E740481C1C}">
                 <a14:useLocalDpi xmlns:a14="http://schemas.microsoft.com/office/drawing/2010/main" val="0"/>
@@ -15952,7 +16027,7 @@
           <p:nvPr/>
         </p:nvPicPr>
         <p:blipFill>
-          <a:blip r:embed="rId5" cstate="print">
+          <a:blip r:embed="rId5" cstate="hqprint">
             <a:extLst>
               <a:ext uri="{28A0092B-C50C-407E-A947-70E740481C1C}">
                 <a14:useLocalDpi xmlns:a14="http://schemas.microsoft.com/office/drawing/2010/main" val="0"/>
@@ -16078,7 +16153,7 @@
           <p:nvPr/>
         </p:nvPicPr>
         <p:blipFill>
-          <a:blip r:embed="rId6" cstate="print">
+          <a:blip r:embed="rId6" cstate="hqprint">
             <a:extLst>
               <a:ext uri="{28A0092B-C50C-407E-A947-70E740481C1C}">
                 <a14:useLocalDpi xmlns:a14="http://schemas.microsoft.com/office/drawing/2010/main" val="0"/>
@@ -16284,7 +16359,7 @@
           <p:nvPr/>
         </p:nvPicPr>
         <p:blipFill>
-          <a:blip r:embed="rId4" cstate="print">
+          <a:blip r:embed="rId4" cstate="hqprint">
             <a:extLst>
               <a:ext uri="{28A0092B-C50C-407E-A947-70E740481C1C}">
                 <a14:useLocalDpi xmlns:a14="http://schemas.microsoft.com/office/drawing/2010/main" val="0"/>
@@ -16590,7 +16665,7 @@
           <p:nvPr/>
         </p:nvPicPr>
         <p:blipFill>
-          <a:blip r:embed="rId2" cstate="print">
+          <a:blip r:embed="rId2" cstate="hqprint">
             <a:extLst>
               <a:ext uri="{28A0092B-C50C-407E-A947-70E740481C1C}">
                 <a14:useLocalDpi xmlns:a14="http://schemas.microsoft.com/office/drawing/2010/main" val="0"/>
@@ -16626,7 +16701,7 @@
           <p:nvPr/>
         </p:nvPicPr>
         <p:blipFill>
-          <a:blip r:embed="rId2" cstate="print">
+          <a:blip r:embed="rId2" cstate="hqprint">
             <a:extLst>
               <a:ext uri="{28A0092B-C50C-407E-A947-70E740481C1C}">
                 <a14:useLocalDpi xmlns:a14="http://schemas.microsoft.com/office/drawing/2010/main" val="0"/>
@@ -16662,7 +16737,7 @@
           <p:nvPr/>
         </p:nvPicPr>
         <p:blipFill>
-          <a:blip r:embed="rId3" cstate="print">
+          <a:blip r:embed="rId3" cstate="hqprint">
             <a:extLst>
               <a:ext uri="{28A0092B-C50C-407E-A947-70E740481C1C}">
                 <a14:useLocalDpi xmlns:a14="http://schemas.microsoft.com/office/drawing/2010/main" val="0"/>
@@ -16698,7 +16773,7 @@
           <p:nvPr/>
         </p:nvPicPr>
         <p:blipFill>
-          <a:blip r:embed="rId4" cstate="print">
+          <a:blip r:embed="rId4" cstate="hqprint">
             <a:extLst>
               <a:ext uri="{28A0092B-C50C-407E-A947-70E740481C1C}">
                 <a14:useLocalDpi xmlns:a14="http://schemas.microsoft.com/office/drawing/2010/main" val="0"/>
@@ -16734,7 +16809,7 @@
           <p:nvPr/>
         </p:nvPicPr>
         <p:blipFill>
-          <a:blip r:embed="rId4" cstate="print">
+          <a:blip r:embed="rId4" cstate="hqprint">
             <a:extLst>
               <a:ext uri="{28A0092B-C50C-407E-A947-70E740481C1C}">
                 <a14:useLocalDpi xmlns:a14="http://schemas.microsoft.com/office/drawing/2010/main" val="0"/>
@@ -16770,7 +16845,7 @@
           <p:nvPr/>
         </p:nvPicPr>
         <p:blipFill>
-          <a:blip r:embed="rId4" cstate="print">
+          <a:blip r:embed="rId4" cstate="hqprint">
             <a:extLst>
               <a:ext uri="{28A0092B-C50C-407E-A947-70E740481C1C}">
                 <a14:useLocalDpi xmlns:a14="http://schemas.microsoft.com/office/drawing/2010/main" val="0"/>
@@ -17103,7 +17178,7 @@
           <p:nvPr/>
         </p:nvPicPr>
         <p:blipFill>
-          <a:blip r:embed="rId5" cstate="print">
+          <a:blip r:embed="rId5" cstate="hqprint">
             <a:extLst>
               <a:ext uri="{28A0092B-C50C-407E-A947-70E740481C1C}">
                 <a14:useLocalDpi xmlns:a14="http://schemas.microsoft.com/office/drawing/2010/main" val="0"/>
@@ -17229,7 +17304,7 @@
           <p:nvPr/>
         </p:nvPicPr>
         <p:blipFill>
-          <a:blip r:embed="rId6" cstate="print">
+          <a:blip r:embed="rId6" cstate="hqprint">
             <a:extLst>
               <a:ext uri="{28A0092B-C50C-407E-A947-70E740481C1C}">
                 <a14:useLocalDpi xmlns:a14="http://schemas.microsoft.com/office/drawing/2010/main" val="0"/>
@@ -17435,7 +17510,7 @@
           <p:nvPr/>
         </p:nvPicPr>
         <p:blipFill>
-          <a:blip r:embed="rId4" cstate="print">
+          <a:blip r:embed="rId4" cstate="hqprint">
             <a:extLst>
               <a:ext uri="{28A0092B-C50C-407E-A947-70E740481C1C}">
                 <a14:useLocalDpi xmlns:a14="http://schemas.microsoft.com/office/drawing/2010/main" val="0"/>

</xml_diff>